<commit_message>
diagram 2 upload and ppt update
</commit_message>
<xml_diff>
--- a/Doc/Sound Sentinel.pptx
+++ b/Doc/Sound Sentinel.pptx
@@ -11,9 +11,9 @@
     <p:sldId id="259" r:id="rId5"/>
     <p:sldId id="260" r:id="rId6"/>
     <p:sldId id="261" r:id="rId7"/>
-    <p:sldId id="262" r:id="rId8"/>
+    <p:sldId id="264" r:id="rId8"/>
     <p:sldId id="263" r:id="rId9"/>
-    <p:sldId id="264" r:id="rId10"/>
+    <p:sldId id="262" r:id="rId10"/>
     <p:sldId id="265" r:id="rId11"/>
     <p:sldId id="266" r:id="rId12"/>
   </p:sldIdLst>
@@ -125,7 +125,7 @@
 <file path=ppt/revisionInfo.xml><?xml version="1.0" encoding="utf-8"?>
 <p1510:revInfo xmlns:a="http://schemas.openxmlformats.org/drawingml/2006/main" xmlns:r="http://schemas.openxmlformats.org/officeDocument/2006/relationships" xmlns:p1510="http://schemas.microsoft.com/office/powerpoint/2015/10/main">
   <p1510:revLst>
-    <p1510:client id="{4C9CDAA8-7EE4-4ABD-9415-D2DB3405BDE0}" v="93" dt="2018-09-15T20:21:26.149"/>
+    <p1510:client id="{4C9CDAA8-7EE4-4ABD-9415-D2DB3405BDE0}" v="121" dt="2018-09-16T03:44:15.648"/>
   </p1510:revLst>
 </p1510:revInfo>
 </file>
@@ -134,8 +134,8 @@
 <pc:chgInfo xmlns:a="http://schemas.openxmlformats.org/drawingml/2006/main" xmlns:r="http://schemas.openxmlformats.org/officeDocument/2006/relationships" xmlns:ac="http://schemas.microsoft.com/office/drawing/2013/main/command" xmlns:pc="http://schemas.microsoft.com/office/powerpoint/2013/main/command">
   <pc:docChgLst>
     <pc:chgData name="Tyrel Parker" userId="3b2fd23d168c23ec" providerId="LiveId" clId="{4C9CDAA8-7EE4-4ABD-9415-D2DB3405BDE0}"/>
-    <pc:docChg chg="custSel modSld">
-      <pc:chgData name="Tyrel Parker" userId="3b2fd23d168c23ec" providerId="LiveId" clId="{4C9CDAA8-7EE4-4ABD-9415-D2DB3405BDE0}" dt="2018-09-15T20:21:26.149" v="92" actId="5793"/>
+    <pc:docChg chg="undo custSel modSld sldOrd">
+      <pc:chgData name="Tyrel Parker" userId="3b2fd23d168c23ec" providerId="LiveId" clId="{4C9CDAA8-7EE4-4ABD-9415-D2DB3405BDE0}" dt="2018-09-16T03:44:15.648" v="120" actId="1076"/>
       <pc:docMkLst>
         <pc:docMk/>
       </pc:docMkLst>
@@ -153,6 +153,105 @@
             <ac:spMk id="3" creationId="{9474FE79-F205-4353-BAE1-F20A9B8F4334}"/>
           </ac:spMkLst>
         </pc:spChg>
+      </pc:sldChg>
+      <pc:sldChg chg="modSp">
+        <pc:chgData name="Tyrel Parker" userId="3b2fd23d168c23ec" providerId="LiveId" clId="{4C9CDAA8-7EE4-4ABD-9415-D2DB3405BDE0}" dt="2018-09-16T02:49:42.817" v="94" actId="14100"/>
+        <pc:sldMkLst>
+          <pc:docMk/>
+          <pc:sldMk cId="2043689047" sldId="259"/>
+        </pc:sldMkLst>
+        <pc:picChg chg="mod">
+          <ac:chgData name="Tyrel Parker" userId="3b2fd23d168c23ec" providerId="LiveId" clId="{4C9CDAA8-7EE4-4ABD-9415-D2DB3405BDE0}" dt="2018-09-16T02:49:42.817" v="94" actId="14100"/>
+          <ac:picMkLst>
+            <pc:docMk/>
+            <pc:sldMk cId="2043689047" sldId="259"/>
+            <ac:picMk id="6" creationId="{AF91339C-D4DE-4B08-97B0-26CD4BE7BAB6}"/>
+          </ac:picMkLst>
+        </pc:picChg>
+      </pc:sldChg>
+      <pc:sldChg chg="addSp delSp modSp">
+        <pc:chgData name="Tyrel Parker" userId="3b2fd23d168c23ec" providerId="LiveId" clId="{4C9CDAA8-7EE4-4ABD-9415-D2DB3405BDE0}" dt="2018-09-16T03:39:23.835" v="107"/>
+        <pc:sldMkLst>
+          <pc:docMk/>
+          <pc:sldMk cId="2869165702" sldId="261"/>
+        </pc:sldMkLst>
+        <pc:spChg chg="del">
+          <ac:chgData name="Tyrel Parker" userId="3b2fd23d168c23ec" providerId="LiveId" clId="{4C9CDAA8-7EE4-4ABD-9415-D2DB3405BDE0}" dt="2018-09-16T02:50:05.702" v="95"/>
+          <ac:spMkLst>
+            <pc:docMk/>
+            <pc:sldMk cId="2869165702" sldId="261"/>
+            <ac:spMk id="3" creationId="{9474FE79-F205-4353-BAE1-F20A9B8F4334}"/>
+          </ac:spMkLst>
+        </pc:spChg>
+        <pc:picChg chg="add mod modCrop">
+          <ac:chgData name="Tyrel Parker" userId="3b2fd23d168c23ec" providerId="LiveId" clId="{4C9CDAA8-7EE4-4ABD-9415-D2DB3405BDE0}" dt="2018-09-16T02:51:09.720" v="101" actId="1076"/>
+          <ac:picMkLst>
+            <pc:docMk/>
+            <pc:sldMk cId="2869165702" sldId="261"/>
+            <ac:picMk id="5" creationId="{548DE54F-3244-472C-85D7-E82CDAF32BB1}"/>
+          </ac:picMkLst>
+        </pc:picChg>
+        <pc:picChg chg="add del mod">
+          <ac:chgData name="Tyrel Parker" userId="3b2fd23d168c23ec" providerId="LiveId" clId="{4C9CDAA8-7EE4-4ABD-9415-D2DB3405BDE0}" dt="2018-09-16T03:39:23.835" v="107"/>
+          <ac:picMkLst>
+            <pc:docMk/>
+            <pc:sldMk cId="2869165702" sldId="261"/>
+            <ac:picMk id="7" creationId="{E476B622-01C4-4004-B133-E14C6324BE3B}"/>
+          </ac:picMkLst>
+        </pc:picChg>
+      </pc:sldChg>
+      <pc:sldChg chg="ord">
+        <pc:chgData name="Tyrel Parker" userId="3b2fd23d168c23ec" providerId="LiveId" clId="{4C9CDAA8-7EE4-4ABD-9415-D2DB3405BDE0}" dt="2018-09-16T03:08:04.102" v="103"/>
+        <pc:sldMkLst>
+          <pc:docMk/>
+          <pc:sldMk cId="3135025597" sldId="262"/>
+        </pc:sldMkLst>
+      </pc:sldChg>
+      <pc:sldChg chg="addSp delSp modSp">
+        <pc:chgData name="Tyrel Parker" userId="3b2fd23d168c23ec" providerId="LiveId" clId="{4C9CDAA8-7EE4-4ABD-9415-D2DB3405BDE0}" dt="2018-09-16T03:44:15.648" v="120" actId="1076"/>
+        <pc:sldMkLst>
+          <pc:docMk/>
+          <pc:sldMk cId="460729124" sldId="263"/>
+        </pc:sldMkLst>
+        <pc:spChg chg="del">
+          <ac:chgData name="Tyrel Parker" userId="3b2fd23d168c23ec" providerId="LiveId" clId="{4C9CDAA8-7EE4-4ABD-9415-D2DB3405BDE0}" dt="2018-09-16T03:39:39.421" v="108"/>
+          <ac:spMkLst>
+            <pc:docMk/>
+            <pc:sldMk cId="460729124" sldId="263"/>
+            <ac:spMk id="3" creationId="{9474FE79-F205-4353-BAE1-F20A9B8F4334}"/>
+          </ac:spMkLst>
+        </pc:spChg>
+        <pc:spChg chg="add del mod">
+          <ac:chgData name="Tyrel Parker" userId="3b2fd23d168c23ec" providerId="LiveId" clId="{4C9CDAA8-7EE4-4ABD-9415-D2DB3405BDE0}" dt="2018-09-16T03:43:52.277" v="114"/>
+          <ac:spMkLst>
+            <pc:docMk/>
+            <pc:sldMk cId="460729124" sldId="263"/>
+            <ac:spMk id="7" creationId="{B2AFEB7E-AF54-421B-9E37-6D0D44F7B36A}"/>
+          </ac:spMkLst>
+        </pc:spChg>
+        <pc:picChg chg="add del mod">
+          <ac:chgData name="Tyrel Parker" userId="3b2fd23d168c23ec" providerId="LiveId" clId="{4C9CDAA8-7EE4-4ABD-9415-D2DB3405BDE0}" dt="2018-09-16T03:40:27.949" v="113" actId="478"/>
+          <ac:picMkLst>
+            <pc:docMk/>
+            <pc:sldMk cId="460729124" sldId="263"/>
+            <ac:picMk id="5" creationId="{D9B18FC0-2D4C-4BCD-838C-33984DBF6614}"/>
+          </ac:picMkLst>
+        </pc:picChg>
+        <pc:picChg chg="add mod">
+          <ac:chgData name="Tyrel Parker" userId="3b2fd23d168c23ec" providerId="LiveId" clId="{4C9CDAA8-7EE4-4ABD-9415-D2DB3405BDE0}" dt="2018-09-16T03:44:15.648" v="120" actId="1076"/>
+          <ac:picMkLst>
+            <pc:docMk/>
+            <pc:sldMk cId="460729124" sldId="263"/>
+            <ac:picMk id="11" creationId="{530F7A73-C073-4A91-BBF7-92C0C5E69CED}"/>
+          </ac:picMkLst>
+        </pc:picChg>
+      </pc:sldChg>
+      <pc:sldChg chg="ord">
+        <pc:chgData name="Tyrel Parker" userId="3b2fd23d168c23ec" providerId="LiveId" clId="{4C9CDAA8-7EE4-4ABD-9415-D2DB3405BDE0}" dt="2018-09-16T03:08:00.445" v="102"/>
+        <pc:sldMkLst>
+          <pc:docMk/>
+          <pc:sldMk cId="2143174890" sldId="264"/>
+        </pc:sldMkLst>
       </pc:sldChg>
     </pc:docChg>
   </pc:docChgLst>
@@ -5749,8 +5848,8 @@
         </p:blipFill>
         <p:spPr>
           <a:xfrm>
-            <a:off x="1686560" y="1341120"/>
-            <a:ext cx="9123680" cy="4998720"/>
+            <a:off x="2139884" y="1341120"/>
+            <a:ext cx="8286161" cy="4998720"/>
           </a:xfrm>
         </p:spPr>
       </p:pic>
@@ -6507,42 +6606,40 @@
           </a:p>
         </p:txBody>
       </p:sp>
-      <p:sp>
-        <p:nvSpPr>
-          <p:cNvPr id="3" name="Content Placeholder 2">
-            <a:extLst>
-              <a:ext uri="{FF2B5EF4-FFF2-40B4-BE49-F238E27FC236}">
-                <a16:creationId xmlns:a16="http://schemas.microsoft.com/office/drawing/2014/main" id="{9474FE79-F205-4353-BAE1-F20A9B8F4334}"/>
-              </a:ext>
-            </a:extLst>
-          </p:cNvPr>
-          <p:cNvSpPr>
-            <a:spLocks noGrp="1"/>
-          </p:cNvSpPr>
+      <p:pic>
+        <p:nvPicPr>
+          <p:cNvPr id="5" name="Content Placeholder 4">
+            <a:extLst>
+              <a:ext uri="{FF2B5EF4-FFF2-40B4-BE49-F238E27FC236}">
+                <a16:creationId xmlns:a16="http://schemas.microsoft.com/office/drawing/2014/main" id="{548DE54F-3244-472C-85D7-E82CDAF32BB1}"/>
+              </a:ext>
+            </a:extLst>
+          </p:cNvPr>
+          <p:cNvPicPr>
+            <a:picLocks noGrp="1" noChangeAspect="1"/>
+          </p:cNvPicPr>
           <p:nvPr>
             <p:ph idx="1"/>
           </p:nvPr>
-        </p:nvSpPr>
+        </p:nvPicPr>
+        <p:blipFill rotWithShape="1">
+          <a:blip r:embed="rId2">
+            <a:extLst>
+              <a:ext uri="{28A0092B-C50C-407E-A947-70E740481C1C}">
+                <a14:useLocalDpi xmlns:a14="http://schemas.microsoft.com/office/drawing/2010/main" val="0"/>
+              </a:ext>
+            </a:extLst>
+          </a:blip>
+          <a:srcRect l="5616" t="8299" r="5616" b="8307"/>
+          <a:stretch/>
+        </p:blipFill>
         <p:spPr>
           <a:xfrm>
-            <a:off x="838201" y="2022601"/>
-            <a:ext cx="10515598" cy="4154361"/>
+            <a:off x="2255519" y="1324928"/>
+            <a:ext cx="7890169" cy="4964112"/>
           </a:xfrm>
         </p:spPr>
-        <p:txBody>
-          <a:bodyPr>
-            <a:normAutofit/>
-          </a:bodyPr>
-          <a:lstStyle/>
-          <a:p>
-            <a:endParaRPr lang="en-US" sz="2000">
-              <a:solidFill>
-                <a:srgbClr val="FFFFFF"/>
-              </a:solidFill>
-            </a:endParaRPr>
-          </a:p>
-        </p:txBody>
-      </p:sp>
+      </p:pic>
     </p:spTree>
     <p:extLst>
       <p:ext uri="{BB962C8B-B14F-4D97-AF65-F5344CB8AC3E}">
@@ -6897,7 +6994,7 @@
                   <a:srgbClr val="FFFFFF"/>
                 </a:solidFill>
               </a:rPr>
-              <a:t>Amanda</a:t>
+              <a:t>Austin</a:t>
             </a:r>
           </a:p>
         </p:txBody>
@@ -6941,7 +7038,7 @@
     </p:spTree>
     <p:extLst>
       <p:ext uri="{BB962C8B-B14F-4D97-AF65-F5344CB8AC3E}">
-        <p14:creationId xmlns:p14="http://schemas.microsoft.com/office/powerpoint/2010/main" val="3135025597"/>
+        <p14:creationId xmlns:p14="http://schemas.microsoft.com/office/powerpoint/2010/main" val="2143174890"/>
       </p:ext>
     </p:extLst>
   </p:cSld>
@@ -7297,42 +7394,41 @@
           </a:p>
         </p:txBody>
       </p:sp>
-      <p:sp>
-        <p:nvSpPr>
-          <p:cNvPr id="3" name="Content Placeholder 2">
-            <a:extLst>
-              <a:ext uri="{FF2B5EF4-FFF2-40B4-BE49-F238E27FC236}">
-                <a16:creationId xmlns:a16="http://schemas.microsoft.com/office/drawing/2014/main" id="{9474FE79-F205-4353-BAE1-F20A9B8F4334}"/>
-              </a:ext>
-            </a:extLst>
-          </p:cNvPr>
-          <p:cNvSpPr>
-            <a:spLocks noGrp="1"/>
-          </p:cNvSpPr>
+      <p:pic>
+        <p:nvPicPr>
+          <p:cNvPr id="11" name="Content Placeholder 10">
+            <a:extLst>
+              <a:ext uri="{FF2B5EF4-FFF2-40B4-BE49-F238E27FC236}">
+                <a16:creationId xmlns:a16="http://schemas.microsoft.com/office/drawing/2014/main" id="{530F7A73-C073-4A91-BBF7-92C0C5E69CED}"/>
+              </a:ext>
+            </a:extLst>
+          </p:cNvPr>
+          <p:cNvPicPr>
+            <a:picLocks noGrp="1" noChangeAspect="1"/>
+          </p:cNvPicPr>
           <p:nvPr>
             <p:ph idx="1"/>
           </p:nvPr>
-        </p:nvSpPr>
+        </p:nvPicPr>
+        <p:blipFill>
+          <a:blip r:embed="rId2">
+            <a:extLst>
+              <a:ext uri="{28A0092B-C50C-407E-A947-70E740481C1C}">
+                <a14:useLocalDpi xmlns:a14="http://schemas.microsoft.com/office/drawing/2010/main" val="0"/>
+              </a:ext>
+            </a:extLst>
+          </a:blip>
+          <a:stretch>
+            <a:fillRect/>
+          </a:stretch>
+        </p:blipFill>
         <p:spPr>
           <a:xfrm>
-            <a:off x="838201" y="2022601"/>
-            <a:ext cx="10515598" cy="4154361"/>
+            <a:off x="2210909" y="1383994"/>
+            <a:ext cx="7764887" cy="5371775"/>
           </a:xfrm>
         </p:spPr>
-        <p:txBody>
-          <a:bodyPr>
-            <a:normAutofit/>
-          </a:bodyPr>
-          <a:lstStyle/>
-          <a:p>
-            <a:endParaRPr lang="en-US" sz="2000">
-              <a:solidFill>
-                <a:srgbClr val="FFFFFF"/>
-              </a:solidFill>
-            </a:endParaRPr>
-          </a:p>
-        </p:txBody>
-      </p:sp>
+      </p:pic>
     </p:spTree>
     <p:extLst>
       <p:ext uri="{BB962C8B-B14F-4D97-AF65-F5344CB8AC3E}">
@@ -7687,7 +7783,7 @@
                   <a:srgbClr val="FFFFFF"/>
                 </a:solidFill>
               </a:rPr>
-              <a:t>Austin</a:t>
+              <a:t>Amanda</a:t>
             </a:r>
           </a:p>
         </p:txBody>
@@ -7731,7 +7827,7 @@
     </p:spTree>
     <p:extLst>
       <p:ext uri="{BB962C8B-B14F-4D97-AF65-F5344CB8AC3E}">
-        <p14:creationId xmlns:p14="http://schemas.microsoft.com/office/powerpoint/2010/main" val="2143174890"/>
+        <p14:creationId xmlns:p14="http://schemas.microsoft.com/office/powerpoint/2010/main" val="3135025597"/>
       </p:ext>
     </p:extLst>
   </p:cSld>

</xml_diff>